<commit_message>
finished weeks 5/6 vis/pres work
</commit_message>
<xml_diff>
--- a/Week4/MSDS670_Week4_Midterm_JeremyBeard.pptx
+++ b/Week4/MSDS670_Week4_Midterm_JeremyBeard.pptx
@@ -140,7 +140,7 @@
 <file path=ppt/revisionInfo.xml><?xml version="1.0" encoding="utf-8"?>
 <p1510:revInfo xmlns:a="http://schemas.openxmlformats.org/drawingml/2006/main" xmlns:r="http://schemas.openxmlformats.org/officeDocument/2006/relationships" xmlns:p1510="http://schemas.microsoft.com/office/powerpoint/2015/10/main">
   <p1510:revLst>
-    <p1510:client id="{93CDB568-3FF5-45DB-B145-164AD87D0628}" v="39" dt="2023-06-03T16:54:31.472"/>
+    <p1510:client id="{93CDB568-3FF5-45DB-B145-164AD87D0628}" v="41" dt="2023-06-11T22:45:40.869"/>
   </p1510:revLst>
 </p1510:revInfo>
 </file>
@@ -4067,7 +4067,7 @@
   <pc:docChgLst>
     <pc:chgData name="Jeremy Beard" userId="9676edfc3f3b3502" providerId="LiveId" clId="{93CDB568-3FF5-45DB-B145-164AD87D0628}"/>
     <pc:docChg chg="custSel addSld delSld modSld delMainMaster modMainMaster">
-      <pc:chgData name="Jeremy Beard" userId="9676edfc3f3b3502" providerId="LiveId" clId="{93CDB568-3FF5-45DB-B145-164AD87D0628}" dt="2023-06-03T17:23:50.920" v="2032" actId="404"/>
+      <pc:chgData name="Jeremy Beard" userId="9676edfc3f3b3502" providerId="LiveId" clId="{93CDB568-3FF5-45DB-B145-164AD87D0628}" dt="2023-06-11T22:45:55.613" v="2035" actId="208"/>
       <pc:docMkLst>
         <pc:docMk/>
       </pc:docMkLst>
@@ -4305,7 +4305,7 @@
         </pc:spChg>
       </pc:sldChg>
       <pc:sldChg chg="addSp delSp modSp mod">
-        <pc:chgData name="Jeremy Beard" userId="9676edfc3f3b3502" providerId="LiveId" clId="{93CDB568-3FF5-45DB-B145-164AD87D0628}" dt="2023-06-03T17:23:50.920" v="2032" actId="404"/>
+        <pc:chgData name="Jeremy Beard" userId="9676edfc3f3b3502" providerId="LiveId" clId="{93CDB568-3FF5-45DB-B145-164AD87D0628}" dt="2023-06-11T22:45:55.613" v="2035" actId="208"/>
         <pc:sldMkLst>
           <pc:docMk/>
           <pc:sldMk cId="3332444629" sldId="347"/>
@@ -4407,7 +4407,7 @@
           </ac:picMkLst>
         </pc:picChg>
         <pc:picChg chg="add mod">
-          <ac:chgData name="Jeremy Beard" userId="9676edfc3f3b3502" providerId="LiveId" clId="{93CDB568-3FF5-45DB-B145-164AD87D0628}" dt="2023-06-03T16:49:46.314" v="223" actId="14100"/>
+          <ac:chgData name="Jeremy Beard" userId="9676edfc3f3b3502" providerId="LiveId" clId="{93CDB568-3FF5-45DB-B145-164AD87D0628}" dt="2023-06-11T22:45:55.613" v="2035" actId="208"/>
           <ac:picMkLst>
             <pc:docMk/>
             <pc:sldMk cId="3332444629" sldId="347"/>
@@ -12532,7 +12532,7 @@
           <a:p>
             <a:fld id="{1CA5457B-CDAE-4DEB-AEC8-C82DE2312E37}" type="datetimeFigureOut">
               <a:rPr lang="en-US" smtClean="0"/>
-              <a:t>6/3/2023</a:t>
+              <a:t>6/11/2023</a:t>
             </a:fld>
             <a:endParaRPr lang="en-US" dirty="0"/>
           </a:p>
@@ -12709,7 +12709,7 @@
           <a:p>
             <a:fld id="{090B78EA-28CE-41D8-9043-90E391E5F567}" type="datetimeFigureOut">
               <a:rPr lang="en-US" noProof="0" smtClean="0"/>
-              <a:t>6/3/2023</a:t>
+              <a:t>6/11/2023</a:t>
             </a:fld>
             <a:endParaRPr lang="en-US" noProof="0" dirty="0"/>
           </a:p>
@@ -13123,7 +13123,7 @@
           <a:p>
             <a:fld id="{305DE05C-EB95-46DA-AAD8-D1B01936870D}" type="datetimeFigureOut">
               <a:rPr lang="en-US" smtClean="0"/>
-              <a:t>6/3/2023</a:t>
+              <a:t>6/11/2023</a:t>
             </a:fld>
             <a:endParaRPr lang="en-US"/>
           </a:p>
@@ -13321,7 +13321,7 @@
           <a:p>
             <a:fld id="{305DE05C-EB95-46DA-AAD8-D1B01936870D}" type="datetimeFigureOut">
               <a:rPr lang="en-US" smtClean="0"/>
-              <a:t>6/3/2023</a:t>
+              <a:t>6/11/2023</a:t>
             </a:fld>
             <a:endParaRPr lang="en-US"/>
           </a:p>
@@ -13530,7 +13530,7 @@
           <a:p>
             <a:fld id="{305DE05C-EB95-46DA-AAD8-D1B01936870D}" type="datetimeFigureOut">
               <a:rPr lang="en-US" smtClean="0"/>
-              <a:t>6/3/2023</a:t>
+              <a:t>6/11/2023</a:t>
             </a:fld>
             <a:endParaRPr lang="en-US"/>
           </a:p>
@@ -22959,7 +22959,7 @@
           <a:p>
             <a:fld id="{305DE05C-EB95-46DA-AAD8-D1B01936870D}" type="datetimeFigureOut">
               <a:rPr lang="en-US" smtClean="0"/>
-              <a:t>6/3/2023</a:t>
+              <a:t>6/11/2023</a:t>
             </a:fld>
             <a:endParaRPr lang="en-US"/>
           </a:p>
@@ -34281,7 +34281,7 @@
           <a:p>
             <a:fld id="{305DE05C-EB95-46DA-AAD8-D1B01936870D}" type="datetimeFigureOut">
               <a:rPr lang="en-US" smtClean="0"/>
-              <a:t>6/3/2023</a:t>
+              <a:t>6/11/2023</a:t>
             </a:fld>
             <a:endParaRPr lang="en-US"/>
           </a:p>
@@ -34479,7 +34479,7 @@
           <a:p>
             <a:fld id="{305DE05C-EB95-46DA-AAD8-D1B01936870D}" type="datetimeFigureOut">
               <a:rPr lang="en-US" smtClean="0"/>
-              <a:t>6/3/2023</a:t>
+              <a:t>6/11/2023</a:t>
             </a:fld>
             <a:endParaRPr lang="en-US"/>
           </a:p>
@@ -34755,7 +34755,7 @@
           <a:p>
             <a:fld id="{305DE05C-EB95-46DA-AAD8-D1B01936870D}" type="datetimeFigureOut">
               <a:rPr lang="en-US" smtClean="0"/>
-              <a:t>6/3/2023</a:t>
+              <a:t>6/11/2023</a:t>
             </a:fld>
             <a:endParaRPr lang="en-US"/>
           </a:p>
@@ -35031,7 +35031,7 @@
           <a:p>
             <a:fld id="{305DE05C-EB95-46DA-AAD8-D1B01936870D}" type="datetimeFigureOut">
               <a:rPr lang="en-US" smtClean="0"/>
-              <a:t>6/3/2023</a:t>
+              <a:t>6/11/2023</a:t>
             </a:fld>
             <a:endParaRPr lang="en-US"/>
           </a:p>
@@ -35297,7 +35297,7 @@
           <a:p>
             <a:fld id="{305DE05C-EB95-46DA-AAD8-D1B01936870D}" type="datetimeFigureOut">
               <a:rPr lang="en-US" smtClean="0"/>
-              <a:t>6/3/2023</a:t>
+              <a:t>6/11/2023</a:t>
             </a:fld>
             <a:endParaRPr lang="en-US"/>
           </a:p>
@@ -35710,7 +35710,7 @@
           <a:p>
             <a:fld id="{305DE05C-EB95-46DA-AAD8-D1B01936870D}" type="datetimeFigureOut">
               <a:rPr lang="en-US" smtClean="0"/>
-              <a:t>6/3/2023</a:t>
+              <a:t>6/11/2023</a:t>
             </a:fld>
             <a:endParaRPr lang="en-US"/>
           </a:p>
@@ -35852,7 +35852,7 @@
           <a:p>
             <a:fld id="{305DE05C-EB95-46DA-AAD8-D1B01936870D}" type="datetimeFigureOut">
               <a:rPr lang="en-US" smtClean="0"/>
-              <a:t>6/3/2023</a:t>
+              <a:t>6/11/2023</a:t>
             </a:fld>
             <a:endParaRPr lang="en-US"/>
           </a:p>
@@ -35966,7 +35966,7 @@
           <a:p>
             <a:fld id="{305DE05C-EB95-46DA-AAD8-D1B01936870D}" type="datetimeFigureOut">
               <a:rPr lang="en-US" smtClean="0"/>
-              <a:t>6/3/2023</a:t>
+              <a:t>6/11/2023</a:t>
             </a:fld>
             <a:endParaRPr lang="en-US"/>
           </a:p>
@@ -36278,7 +36278,7 @@
           <a:p>
             <a:fld id="{305DE05C-EB95-46DA-AAD8-D1B01936870D}" type="datetimeFigureOut">
               <a:rPr lang="en-US" smtClean="0"/>
-              <a:t>6/3/2023</a:t>
+              <a:t>6/11/2023</a:t>
             </a:fld>
             <a:endParaRPr lang="en-US"/>
           </a:p>
@@ -36567,7 +36567,7 @@
           <a:p>
             <a:fld id="{305DE05C-EB95-46DA-AAD8-D1B01936870D}" type="datetimeFigureOut">
               <a:rPr lang="en-US" smtClean="0"/>
-              <a:t>6/3/2023</a:t>
+              <a:t>6/11/2023</a:t>
             </a:fld>
             <a:endParaRPr lang="en-US"/>
           </a:p>
@@ -36766,7 +36766,7 @@
           <a:p>
             <a:fld id="{305DE05C-EB95-46DA-AAD8-D1B01936870D}" type="datetimeFigureOut">
               <a:rPr lang="en-US" smtClean="0"/>
-              <a:t>6/3/2023</a:t>
+              <a:t>6/11/2023</a:t>
             </a:fld>
             <a:endParaRPr lang="en-US"/>
           </a:p>
@@ -36975,7 +36975,7 @@
           <a:p>
             <a:fld id="{305DE05C-EB95-46DA-AAD8-D1B01936870D}" type="datetimeFigureOut">
               <a:rPr lang="en-US" smtClean="0"/>
-              <a:t>6/3/2023</a:t>
+              <a:t>6/11/2023</a:t>
             </a:fld>
             <a:endParaRPr lang="en-US"/>
           </a:p>
@@ -37241,7 +37241,7 @@
           <a:p>
             <a:fld id="{305DE05C-EB95-46DA-AAD8-D1B01936870D}" type="datetimeFigureOut">
               <a:rPr lang="en-US" smtClean="0"/>
-              <a:t>6/3/2023</a:t>
+              <a:t>6/11/2023</a:t>
             </a:fld>
             <a:endParaRPr lang="en-US"/>
           </a:p>
@@ -37654,7 +37654,7 @@
           <a:p>
             <a:fld id="{305DE05C-EB95-46DA-AAD8-D1B01936870D}" type="datetimeFigureOut">
               <a:rPr lang="en-US" smtClean="0"/>
-              <a:t>6/3/2023</a:t>
+              <a:t>6/11/2023</a:t>
             </a:fld>
             <a:endParaRPr lang="en-US"/>
           </a:p>
@@ -37796,7 +37796,7 @@
           <a:p>
             <a:fld id="{305DE05C-EB95-46DA-AAD8-D1B01936870D}" type="datetimeFigureOut">
               <a:rPr lang="en-US" smtClean="0"/>
-              <a:t>6/3/2023</a:t>
+              <a:t>6/11/2023</a:t>
             </a:fld>
             <a:endParaRPr lang="en-US"/>
           </a:p>
@@ -37910,7 +37910,7 @@
           <a:p>
             <a:fld id="{305DE05C-EB95-46DA-AAD8-D1B01936870D}" type="datetimeFigureOut">
               <a:rPr lang="en-US" smtClean="0"/>
-              <a:t>6/3/2023</a:t>
+              <a:t>6/11/2023</a:t>
             </a:fld>
             <a:endParaRPr lang="en-US"/>
           </a:p>
@@ -38222,7 +38222,7 @@
           <a:p>
             <a:fld id="{305DE05C-EB95-46DA-AAD8-D1B01936870D}" type="datetimeFigureOut">
               <a:rPr lang="en-US" smtClean="0"/>
-              <a:t>6/3/2023</a:t>
+              <a:t>6/11/2023</a:t>
             </a:fld>
             <a:endParaRPr lang="en-US"/>
           </a:p>
@@ -38511,7 +38511,7 @@
           <a:p>
             <a:fld id="{305DE05C-EB95-46DA-AAD8-D1B01936870D}" type="datetimeFigureOut">
               <a:rPr lang="en-US" smtClean="0"/>
-              <a:t>6/3/2023</a:t>
+              <a:t>6/11/2023</a:t>
             </a:fld>
             <a:endParaRPr lang="en-US"/>
           </a:p>
@@ -38753,7 +38753,7 @@
           <a:p>
             <a:fld id="{305DE05C-EB95-46DA-AAD8-D1B01936870D}" type="datetimeFigureOut">
               <a:rPr lang="en-US" smtClean="0"/>
-              <a:t>6/3/2023</a:t>
+              <a:t>6/11/2023</a:t>
             </a:fld>
             <a:endParaRPr lang="en-US"/>
           </a:p>
@@ -39338,7 +39338,7 @@
           <a:p>
             <a:fld id="{305DE05C-EB95-46DA-AAD8-D1B01936870D}" type="datetimeFigureOut">
               <a:rPr lang="en-US" smtClean="0"/>
-              <a:t>6/3/2023</a:t>
+              <a:t>6/11/2023</a:t>
             </a:fld>
             <a:endParaRPr lang="en-US"/>
           </a:p>
@@ -40107,6 +40107,11 @@
           <a:prstGeom prst="rect">
             <a:avLst/>
           </a:prstGeom>
+          <a:ln>
+            <a:solidFill>
+              <a:schemeClr val="bg1"/>
+            </a:solidFill>
+          </a:ln>
         </p:spPr>
       </p:pic>
       <p:sp>
@@ -40733,13 +40738,13 @@
   <p:clrMapOvr>
     <a:masterClrMapping/>
   </p:clrMapOvr>
-  <mc:AlternateContent xmlns:mc="http://schemas.openxmlformats.org/markup-compatibility/2006">
-    <mc:Choice xmlns:p14="http://schemas.microsoft.com/office/powerpoint/2010/main" Requires="p14">
+  <mc:AlternateContent xmlns:mc="http://schemas.openxmlformats.org/markup-compatibility/2006" xmlns:p14="http://schemas.microsoft.com/office/powerpoint/2010/main">
+    <mc:Choice Requires="p14">
       <p:transition spd="med" p14:dur="700">
         <p:fade/>
       </p:transition>
     </mc:Choice>
-    <mc:Fallback>
+    <mc:Fallback xmlns="">
       <p:transition spd="med">
         <p:fade/>
       </p:transition>
@@ -42170,23 +42175,6 @@
 </file>
 
 <file path=customXml/item1.xml><?xml version="1.0" encoding="utf-8"?>
-<p:properties xmlns:p="http://schemas.microsoft.com/office/2006/metadata/properties" xmlns:xsi="http://www.w3.org/2001/XMLSchema-instance" xmlns:pc="http://schemas.microsoft.com/office/infopath/2007/PartnerControls">
-  <documentManagement>
-    <MediaServiceKeyPoints xmlns="71af3243-3dd4-4a8d-8c0d-dd76da1f02a5" xsi:nil="true"/>
-  </documentManagement>
-</p:properties>
-</file>
-
-<file path=customXml/item2.xml><?xml version="1.0" encoding="utf-8"?>
-<?mso-contentType ?>
-<FormTemplates xmlns="http://schemas.microsoft.com/sharepoint/v3/contenttype/forms">
-  <Display>DocumentLibraryForm</Display>
-  <Edit>DocumentLibraryForm</Edit>
-  <New>DocumentLibraryForm</New>
-</FormTemplates>
-</file>
-
-<file path=customXml/item3.xml><?xml version="1.0" encoding="utf-8"?>
 <ct:contentTypeSchema xmlns:ct="http://schemas.microsoft.com/office/2006/metadata/contentType" xmlns:ma="http://schemas.microsoft.com/office/2006/metadata/properties/metaAttributes" ct:_="" ma:_="" ma:contentTypeName="Document" ma:contentTypeID="0x01010079F111ED35F8CC479449609E8A0923A6" ma:contentTypeVersion="11" ma:contentTypeDescription="Create a new document." ma:contentTypeScope="" ma:versionID="96291512c1ee715ab617f4c07df79fc1">
   <xsd:schema xmlns:xsd="http://www.w3.org/2001/XMLSchema" xmlns:xs="http://www.w3.org/2001/XMLSchema" xmlns:p="http://schemas.microsoft.com/office/2006/metadata/properties" xmlns:ns2="71af3243-3dd4-4a8d-8c0d-dd76da1f02a5" xmlns:ns3="16c05727-aa75-4e4a-9b5f-8a80a1165891" targetNamespace="http://schemas.microsoft.com/office/2006/metadata/properties" ma:root="true" ma:fieldsID="8256c27c40ca5c40ce1cf6c44f0205df" ns2:_="" ns3:_="">
     <xsd:import namespace="71af3243-3dd4-4a8d-8c0d-dd76da1f02a5"/>
@@ -42397,25 +42385,24 @@
 </ct:contentTypeSchema>
 </file>
 
-<file path=customXml/itemProps1.xml><?xml version="1.0" encoding="utf-8"?>
-<ds:datastoreItem xmlns:ds="http://schemas.openxmlformats.org/officeDocument/2006/customXml" ds:itemID="{F5757914-1161-4661-9696-421FD6935CDD}">
-  <ds:schemaRefs>
-    <ds:schemaRef ds:uri="http://schemas.microsoft.com/office/2006/metadata/properties"/>
-    <ds:schemaRef ds:uri="http://schemas.microsoft.com/office/infopath/2007/PartnerControls"/>
-    <ds:schemaRef ds:uri="71af3243-3dd4-4a8d-8c0d-dd76da1f02a5"/>
-  </ds:schemaRefs>
-</ds:datastoreItem>
+<file path=customXml/item2.xml><?xml version="1.0" encoding="utf-8"?>
+<?mso-contentType ?>
+<FormTemplates xmlns="http://schemas.microsoft.com/sharepoint/v3/contenttype/forms">
+  <Display>DocumentLibraryForm</Display>
+  <Edit>DocumentLibraryForm</Edit>
+  <New>DocumentLibraryForm</New>
+</FormTemplates>
 </file>
 
-<file path=customXml/itemProps2.xml><?xml version="1.0" encoding="utf-8"?>
-<ds:datastoreItem xmlns:ds="http://schemas.openxmlformats.org/officeDocument/2006/customXml" ds:itemID="{5B26E0C9-B2AA-42E6-97B6-E1B7D9EAF129}">
-  <ds:schemaRefs>
-    <ds:schemaRef ds:uri="http://schemas.microsoft.com/sharepoint/v3/contenttype/forms"/>
-  </ds:schemaRefs>
-</ds:datastoreItem>
+<file path=customXml/item3.xml><?xml version="1.0" encoding="utf-8"?>
+<p:properties xmlns:p="http://schemas.microsoft.com/office/2006/metadata/properties" xmlns:xsi="http://www.w3.org/2001/XMLSchema-instance" xmlns:pc="http://schemas.microsoft.com/office/infopath/2007/PartnerControls">
+  <documentManagement>
+    <MediaServiceKeyPoints xmlns="71af3243-3dd4-4a8d-8c0d-dd76da1f02a5" xsi:nil="true"/>
+  </documentManagement>
+</p:properties>
 </file>
 
-<file path=customXml/itemProps3.xml><?xml version="1.0" encoding="utf-8"?>
+<file path=customXml/itemProps1.xml><?xml version="1.0" encoding="utf-8"?>
 <ds:datastoreItem xmlns:ds="http://schemas.openxmlformats.org/officeDocument/2006/customXml" ds:itemID="{4C103400-4A22-4E35-B588-4C4D42638959}">
   <ds:schemaRefs>
     <ds:schemaRef ds:uri="http://schemas.microsoft.com/office/2006/metadata/contentType"/>
@@ -42432,4 +42419,22 @@
     <ds:schemaRef ds:uri="http://schemas.microsoft.com/internal/obd"/>
   </ds:schemaRefs>
 </ds:datastoreItem>
+</file>
+
+<file path=customXml/itemProps2.xml><?xml version="1.0" encoding="utf-8"?>
+<ds:datastoreItem xmlns:ds="http://schemas.openxmlformats.org/officeDocument/2006/customXml" ds:itemID="{5B26E0C9-B2AA-42E6-97B6-E1B7D9EAF129}">
+  <ds:schemaRefs>
+    <ds:schemaRef ds:uri="http://schemas.microsoft.com/sharepoint/v3/contenttype/forms"/>
+  </ds:schemaRefs>
+</ds:datastoreItem>
+</file>
+
+<file path=customXml/itemProps3.xml><?xml version="1.0" encoding="utf-8"?>
+<ds:datastoreItem xmlns:ds="http://schemas.openxmlformats.org/officeDocument/2006/customXml" ds:itemID="{F5757914-1161-4661-9696-421FD6935CDD}">
+  <ds:schemaRefs>
+    <ds:schemaRef ds:uri="http://schemas.microsoft.com/office/2006/metadata/properties"/>
+    <ds:schemaRef ds:uri="http://schemas.microsoft.com/office/infopath/2007/PartnerControls"/>
+    <ds:schemaRef ds:uri="71af3243-3dd4-4a8d-8c0d-dd76da1f02a5"/>
+  </ds:schemaRefs>
+</ds:datastoreItem>
 </file>
</xml_diff>